<commit_message>
Update Ubuntu & ROS 설치 (Remote PC).pptx
</commit_message>
<xml_diff>
--- a/Turtlebot/Ubuntu & ROS 설치 (Remote PC).pptx
+++ b/Turtlebot/Ubuntu & ROS 설치 (Remote PC).pptx
@@ -283,7 +283,7 @@
           <a:p>
             <a:fld id="{F7232416-3236-4BEC-9F65-32C6B7F68842}" type="datetimeFigureOut">
               <a:rPr lang="ko-KR" altLang="en-US" smtClean="0"/>
-              <a:t>2020-07-27</a:t>
+              <a:t>2020-08-20</a:t>
             </a:fld>
             <a:endParaRPr lang="ko-KR" altLang="en-US"/>
           </a:p>
@@ -481,7 +481,7 @@
           <a:p>
             <a:fld id="{F7232416-3236-4BEC-9F65-32C6B7F68842}" type="datetimeFigureOut">
               <a:rPr lang="ko-KR" altLang="en-US" smtClean="0"/>
-              <a:t>2020-07-27</a:t>
+              <a:t>2020-08-20</a:t>
             </a:fld>
             <a:endParaRPr lang="ko-KR" altLang="en-US"/>
           </a:p>
@@ -689,7 +689,7 @@
           <a:p>
             <a:fld id="{F7232416-3236-4BEC-9F65-32C6B7F68842}" type="datetimeFigureOut">
               <a:rPr lang="ko-KR" altLang="en-US" smtClean="0"/>
-              <a:t>2020-07-27</a:t>
+              <a:t>2020-08-20</a:t>
             </a:fld>
             <a:endParaRPr lang="ko-KR" altLang="en-US"/>
           </a:p>
@@ -887,7 +887,7 @@
           <a:p>
             <a:fld id="{F7232416-3236-4BEC-9F65-32C6B7F68842}" type="datetimeFigureOut">
               <a:rPr lang="ko-KR" altLang="en-US" smtClean="0"/>
-              <a:t>2020-07-27</a:t>
+              <a:t>2020-08-20</a:t>
             </a:fld>
             <a:endParaRPr lang="ko-KR" altLang="en-US"/>
           </a:p>
@@ -1162,7 +1162,7 @@
           <a:p>
             <a:fld id="{F7232416-3236-4BEC-9F65-32C6B7F68842}" type="datetimeFigureOut">
               <a:rPr lang="ko-KR" altLang="en-US" smtClean="0"/>
-              <a:t>2020-07-27</a:t>
+              <a:t>2020-08-20</a:t>
             </a:fld>
             <a:endParaRPr lang="ko-KR" altLang="en-US"/>
           </a:p>
@@ -1427,7 +1427,7 @@
           <a:p>
             <a:fld id="{F7232416-3236-4BEC-9F65-32C6B7F68842}" type="datetimeFigureOut">
               <a:rPr lang="ko-KR" altLang="en-US" smtClean="0"/>
-              <a:t>2020-07-27</a:t>
+              <a:t>2020-08-20</a:t>
             </a:fld>
             <a:endParaRPr lang="ko-KR" altLang="en-US"/>
           </a:p>
@@ -1839,7 +1839,7 @@
           <a:p>
             <a:fld id="{F7232416-3236-4BEC-9F65-32C6B7F68842}" type="datetimeFigureOut">
               <a:rPr lang="ko-KR" altLang="en-US" smtClean="0"/>
-              <a:t>2020-07-27</a:t>
+              <a:t>2020-08-20</a:t>
             </a:fld>
             <a:endParaRPr lang="ko-KR" altLang="en-US"/>
           </a:p>
@@ -1980,7 +1980,7 @@
           <a:p>
             <a:fld id="{F7232416-3236-4BEC-9F65-32C6B7F68842}" type="datetimeFigureOut">
               <a:rPr lang="ko-KR" altLang="en-US" smtClean="0"/>
-              <a:t>2020-07-27</a:t>
+              <a:t>2020-08-20</a:t>
             </a:fld>
             <a:endParaRPr lang="ko-KR" altLang="en-US"/>
           </a:p>
@@ -2093,7 +2093,7 @@
           <a:p>
             <a:fld id="{F7232416-3236-4BEC-9F65-32C6B7F68842}" type="datetimeFigureOut">
               <a:rPr lang="ko-KR" altLang="en-US" smtClean="0"/>
-              <a:t>2020-07-27</a:t>
+              <a:t>2020-08-20</a:t>
             </a:fld>
             <a:endParaRPr lang="ko-KR" altLang="en-US"/>
           </a:p>
@@ -2404,7 +2404,7 @@
           <a:p>
             <a:fld id="{F7232416-3236-4BEC-9F65-32C6B7F68842}" type="datetimeFigureOut">
               <a:rPr lang="ko-KR" altLang="en-US" smtClean="0"/>
-              <a:t>2020-07-27</a:t>
+              <a:t>2020-08-20</a:t>
             </a:fld>
             <a:endParaRPr lang="ko-KR" altLang="en-US"/>
           </a:p>
@@ -2692,7 +2692,7 @@
           <a:p>
             <a:fld id="{F7232416-3236-4BEC-9F65-32C6B7F68842}" type="datetimeFigureOut">
               <a:rPr lang="ko-KR" altLang="en-US" smtClean="0"/>
-              <a:t>2020-07-27</a:t>
+              <a:t>2020-08-20</a:t>
             </a:fld>
             <a:endParaRPr lang="ko-KR" altLang="en-US"/>
           </a:p>
@@ -2933,7 +2933,7 @@
           <a:p>
             <a:fld id="{F7232416-3236-4BEC-9F65-32C6B7F68842}" type="datetimeFigureOut">
               <a:rPr lang="ko-KR" altLang="en-US" smtClean="0"/>
-              <a:t>2020-07-27</a:t>
+              <a:t>2020-08-20</a:t>
             </a:fld>
             <a:endParaRPr lang="ko-KR" altLang="en-US"/>
           </a:p>
@@ -3549,7 +3549,7 @@
     <mc:Choice Requires="p14">
       <p:transition/>
     </mc:Choice>
-    <mc:Fallback xmlns:dsp="http://schemas.microsoft.com/office/drawing/2008/diagram" xmlns:dgm="http://schemas.openxmlformats.org/drawingml/2006/diagram" xmlns:c="http://schemas.openxmlformats.org/drawingml/2006/chart" xmlns="">
+    <mc:Fallback xmlns="" xmlns:c="http://schemas.openxmlformats.org/drawingml/2006/chart" xmlns:dgm="http://schemas.openxmlformats.org/drawingml/2006/diagram" xmlns:dsp="http://schemas.microsoft.com/office/drawing/2008/diagram">
       <p:transition/>
     </mc:Fallback>
   </mc:AlternateContent>
@@ -4323,7 +4323,7 @@
     <mc:Choice Requires="p14">
       <p:transition/>
     </mc:Choice>
-    <mc:Fallback xmlns:dsp="http://schemas.microsoft.com/office/drawing/2008/diagram" xmlns:dgm="http://schemas.openxmlformats.org/drawingml/2006/diagram" xmlns:c="http://schemas.openxmlformats.org/drawingml/2006/chart" xmlns="">
+    <mc:Fallback xmlns="" xmlns:c="http://schemas.openxmlformats.org/drawingml/2006/chart" xmlns:dgm="http://schemas.openxmlformats.org/drawingml/2006/diagram" xmlns:dsp="http://schemas.microsoft.com/office/drawing/2008/diagram">
       <p:transition/>
     </mc:Fallback>
   </mc:AlternateContent>
@@ -4728,7 +4728,7 @@
     <mc:Choice Requires="p14">
       <p:transition/>
     </mc:Choice>
-    <mc:Fallback xmlns:dsp="http://schemas.microsoft.com/office/drawing/2008/diagram" xmlns:dgm="http://schemas.openxmlformats.org/drawingml/2006/diagram" xmlns:c="http://schemas.openxmlformats.org/drawingml/2006/chart" xmlns="">
+    <mc:Fallback xmlns="" xmlns:c="http://schemas.openxmlformats.org/drawingml/2006/chart" xmlns:dgm="http://schemas.openxmlformats.org/drawingml/2006/diagram" xmlns:dsp="http://schemas.microsoft.com/office/drawing/2008/diagram">
       <p:transition/>
     </mc:Fallback>
   </mc:AlternateContent>
@@ -5335,7 +5335,7 @@
     <mc:Choice Requires="p14">
       <p:transition/>
     </mc:Choice>
-    <mc:Fallback xmlns:dsp="http://schemas.microsoft.com/office/drawing/2008/diagram" xmlns:dgm="http://schemas.openxmlformats.org/drawingml/2006/diagram" xmlns:c="http://schemas.openxmlformats.org/drawingml/2006/chart" xmlns="">
+    <mc:Fallback xmlns="" xmlns:c="http://schemas.openxmlformats.org/drawingml/2006/chart" xmlns:dgm="http://schemas.openxmlformats.org/drawingml/2006/diagram" xmlns:dsp="http://schemas.microsoft.com/office/drawing/2008/diagram">
       <p:transition/>
     </mc:Fallback>
   </mc:AlternateContent>
@@ -5640,7 +5640,7 @@
     <mc:Choice Requires="p14">
       <p:transition/>
     </mc:Choice>
-    <mc:Fallback xmlns:dsp="http://schemas.microsoft.com/office/drawing/2008/diagram" xmlns:dgm="http://schemas.openxmlformats.org/drawingml/2006/diagram" xmlns:c="http://schemas.openxmlformats.org/drawingml/2006/chart" xmlns="">
+    <mc:Fallback xmlns="" xmlns:c="http://schemas.openxmlformats.org/drawingml/2006/chart" xmlns:dgm="http://schemas.openxmlformats.org/drawingml/2006/diagram" xmlns:dsp="http://schemas.microsoft.com/office/drawing/2008/diagram">
       <p:transition/>
     </mc:Fallback>
   </mc:AlternateContent>
@@ -5874,7 +5874,7 @@
     <mc:Choice Requires="p14">
       <p:transition/>
     </mc:Choice>
-    <mc:Fallback xmlns:dsp="http://schemas.microsoft.com/office/drawing/2008/diagram" xmlns:dgm="http://schemas.openxmlformats.org/drawingml/2006/diagram" xmlns:c="http://schemas.openxmlformats.org/drawingml/2006/chart" xmlns="">
+    <mc:Fallback xmlns="" xmlns:c="http://schemas.openxmlformats.org/drawingml/2006/chart" xmlns:dgm="http://schemas.openxmlformats.org/drawingml/2006/diagram" xmlns:dsp="http://schemas.microsoft.com/office/drawing/2008/diagram">
       <p:transition/>
     </mc:Fallback>
   </mc:AlternateContent>
@@ -6843,7 +6843,7 @@
     <mc:Choice Requires="p14">
       <p:transition/>
     </mc:Choice>
-    <mc:Fallback xmlns:dsp="http://schemas.microsoft.com/office/drawing/2008/diagram" xmlns:dgm="http://schemas.openxmlformats.org/drawingml/2006/diagram" xmlns:c="http://schemas.openxmlformats.org/drawingml/2006/chart" xmlns="">
+    <mc:Fallback xmlns="" xmlns:c="http://schemas.openxmlformats.org/drawingml/2006/chart" xmlns:dgm="http://schemas.openxmlformats.org/drawingml/2006/diagram" xmlns:dsp="http://schemas.microsoft.com/office/drawing/2008/diagram">
       <p:transition/>
     </mc:Fallback>
   </mc:AlternateContent>
@@ -8230,7 +8230,7 @@
     <mc:Choice Requires="p14">
       <p:transition/>
     </mc:Choice>
-    <mc:Fallback xmlns:dsp="http://schemas.microsoft.com/office/drawing/2008/diagram" xmlns:dgm="http://schemas.openxmlformats.org/drawingml/2006/diagram" xmlns:c="http://schemas.openxmlformats.org/drawingml/2006/chart" xmlns="">
+    <mc:Fallback xmlns="" xmlns:c="http://schemas.openxmlformats.org/drawingml/2006/chart" xmlns:dgm="http://schemas.openxmlformats.org/drawingml/2006/diagram" xmlns:dsp="http://schemas.microsoft.com/office/drawing/2008/diagram">
       <p:transition/>
     </mc:Fallback>
   </mc:AlternateContent>
@@ -8505,7 +8505,7 @@
         <p:spPr>
           <a:xfrm>
             <a:off x="1112443" y="1115782"/>
-            <a:ext cx="4020273" cy="923330"/>
+            <a:ext cx="4736266" cy="923330"/>
           </a:xfrm>
           <a:prstGeom prst="rect">
             <a:avLst/>
@@ -8535,21 +8535,23 @@
             </a:endParaRPr>
           </a:p>
           <a:p>
+            <a:pPr lvl="1"/>
             <a:r>
               <a:rPr lang="en-US" altLang="ko-KR" dirty="0">
                 <a:latin typeface="바탕" panose="02030600000101010101" pitchFamily="18" charset="-127"/>
                 <a:ea typeface="바탕" panose="02030600000101010101" pitchFamily="18" charset="-127"/>
               </a:rPr>
-              <a:t>    Terminal : Ctrl + Shift + C</a:t>
-            </a:r>
-          </a:p>
-          <a:p>
+              <a:t>Terminal : Ctrl + Shift + C</a:t>
+            </a:r>
+          </a:p>
+          <a:p>
+            <a:pPr lvl="1"/>
             <a:r>
               <a:rPr lang="en-US" altLang="ko-KR" dirty="0">
                 <a:latin typeface="바탕" panose="02030600000101010101" pitchFamily="18" charset="-127"/>
                 <a:ea typeface="바탕" panose="02030600000101010101" pitchFamily="18" charset="-127"/>
               </a:rPr>
-              <a:t>    Terminal</a:t>
+              <a:t>Terminal</a:t>
             </a:r>
             <a:r>
               <a:rPr lang="ko-KR" altLang="en-US" dirty="0">
@@ -8582,8 +8584,8 @@
         </p:nvSpPr>
         <p:spPr>
           <a:xfrm>
-            <a:off x="1112444" y="2383865"/>
-            <a:ext cx="4020272" cy="923330"/>
+            <a:off x="1112443" y="2383865"/>
+            <a:ext cx="4477473" cy="923330"/>
           </a:xfrm>
           <a:prstGeom prst="rect">
             <a:avLst/>
@@ -8613,21 +8615,23 @@
             </a:endParaRPr>
           </a:p>
           <a:p>
+            <a:pPr lvl="1"/>
             <a:r>
               <a:rPr lang="en-US" altLang="ko-KR" dirty="0">
                 <a:latin typeface="바탕" panose="02030600000101010101" pitchFamily="18" charset="-127"/>
                 <a:ea typeface="바탕" panose="02030600000101010101" pitchFamily="18" charset="-127"/>
               </a:rPr>
-              <a:t>    Terminal : Ctrl + Shift + V</a:t>
-            </a:r>
-          </a:p>
-          <a:p>
+              <a:t>Terminal : Ctrl + Shift + V</a:t>
+            </a:r>
+          </a:p>
+          <a:p>
+            <a:pPr lvl="1"/>
             <a:r>
               <a:rPr lang="en-US" altLang="ko-KR" dirty="0">
                 <a:latin typeface="바탕" panose="02030600000101010101" pitchFamily="18" charset="-127"/>
                 <a:ea typeface="바탕" panose="02030600000101010101" pitchFamily="18" charset="-127"/>
               </a:rPr>
-              <a:t>    Terminal</a:t>
+              <a:t>Terminal</a:t>
             </a:r>
             <a:r>
               <a:rPr lang="ko-KR" altLang="en-US" dirty="0">
@@ -8698,12 +8702,76 @@
             </a:endParaRPr>
           </a:p>
           <a:p>
+            <a:pPr lvl="1"/>
             <a:r>
               <a:rPr lang="en-US" altLang="ko-KR" dirty="0">
                 <a:latin typeface="바탕" panose="02030600000101010101" pitchFamily="18" charset="-127"/>
                 <a:ea typeface="바탕" panose="02030600000101010101" pitchFamily="18" charset="-127"/>
               </a:rPr>
-              <a:t>    Ctrl + Alt + t</a:t>
+              <a:t>Ctrl + Alt + t</a:t>
+            </a:r>
+          </a:p>
+        </p:txBody>
+      </p:sp>
+      <p:sp>
+        <p:nvSpPr>
+          <p:cNvPr id="11" name="TextBox 10">
+            <a:extLst>
+              <a:ext uri="{FF2B5EF4-FFF2-40B4-BE49-F238E27FC236}">
+                <a16:creationId xmlns:a16="http://schemas.microsoft.com/office/drawing/2014/main" id="{49C8F555-E130-4A4B-A467-FE9A8C31ABF5}"/>
+              </a:ext>
+            </a:extLst>
+          </p:cNvPr>
+          <p:cNvSpPr txBox="1"/>
+          <p:nvPr/>
+        </p:nvSpPr>
+        <p:spPr>
+          <a:xfrm>
+            <a:off x="1112442" y="4763802"/>
+            <a:ext cx="4339451" cy="646331"/>
+          </a:xfrm>
+          <a:prstGeom prst="rect">
+            <a:avLst/>
+          </a:prstGeom>
+          <a:noFill/>
+        </p:spPr>
+        <p:txBody>
+          <a:bodyPr wrap="square" rtlCol="0">
+            <a:spAutoFit/>
+          </a:bodyPr>
+          <a:lstStyle/>
+          <a:p>
+            <a:pPr marL="285750" indent="-285750">
+              <a:buFont typeface="Arial" panose="020B0604020202020204" pitchFamily="34" charset="0"/>
+              <a:buChar char="•"/>
+            </a:pPr>
+            <a:r>
+              <a:rPr lang="en-US" altLang="ko-KR" dirty="0">
+                <a:latin typeface="바탕" panose="02030600000101010101" pitchFamily="18" charset="-127"/>
+                <a:ea typeface="바탕" panose="02030600000101010101" pitchFamily="18" charset="-127"/>
+              </a:rPr>
+              <a:t>Terminal</a:t>
+            </a:r>
+            <a:r>
+              <a:rPr lang="ko-KR" altLang="en-US" dirty="0">
+                <a:latin typeface="바탕" panose="02030600000101010101" pitchFamily="18" charset="-127"/>
+                <a:ea typeface="바탕" panose="02030600000101010101" pitchFamily="18" charset="-127"/>
+              </a:rPr>
+              <a:t>에 입력한 명령어 실행 종료</a:t>
+            </a:r>
+            <a:endParaRPr lang="en-US" altLang="ko-KR" dirty="0">
+              <a:latin typeface="바탕" panose="02030600000101010101" pitchFamily="18" charset="-127"/>
+              <a:ea typeface="바탕" panose="02030600000101010101" pitchFamily="18" charset="-127"/>
+            </a:endParaRPr>
+          </a:p>
+          <a:p>
+            <a:pPr lvl="1"/>
+            <a:r>
+              <a:rPr lang="en-US" altLang="ko-KR" dirty="0">
+                <a:latin typeface="바탕" panose="02030600000101010101" pitchFamily="18" charset="-127"/>
+                <a:ea typeface="바탕" panose="02030600000101010101" pitchFamily="18" charset="-127"/>
+              </a:rPr>
+              <a:t>Ctrl + c</a:t>
             </a:r>
           </a:p>
         </p:txBody>
@@ -8722,7 +8790,7 @@
     <mc:Choice Requires="p14">
       <p:transition/>
     </mc:Choice>
-    <mc:Fallback xmlns:dsp="http://schemas.microsoft.com/office/drawing/2008/diagram" xmlns:dgm="http://schemas.openxmlformats.org/drawingml/2006/diagram" xmlns:c="http://schemas.openxmlformats.org/drawingml/2006/chart" xmlns="">
+    <mc:Fallback xmlns="" xmlns:c="http://schemas.openxmlformats.org/drawingml/2006/chart" xmlns:dgm="http://schemas.openxmlformats.org/drawingml/2006/diagram" xmlns:dsp="http://schemas.microsoft.com/office/drawing/2008/diagram">
       <p:transition/>
     </mc:Fallback>
   </mc:AlternateContent>

</xml_diff>